<commit_message>
adds literature and corrects pptx
</commit_message>
<xml_diff>
--- a/Proposalvortrag.pptx
+++ b/Proposalvortrag.pptx
@@ -3919,7 +3919,7 @@
           <a:p>
             <a:fld id="{A423BF71-38B7-8642-BFCE-EDAE9BD0CBAF}" type="datetimeFigureOut">
               <a:rPr lang="en-US" dirty="0"/>
-              <a:t>5/27/2021</a:t>
+              <a:t>6/2/2021</a:t>
             </a:fld>
             <a:endParaRPr lang="en-US" dirty="0"/>
           </a:p>
@@ -4142,7 +4142,7 @@
           <a:p>
             <a:fld id="{73B025CB-9D18-264E-A945-2D020344C9DA}" type="datetimeFigureOut">
               <a:rPr lang="en-US" dirty="0"/>
-              <a:t>5/27/2021</a:t>
+              <a:t>6/2/2021</a:t>
             </a:fld>
             <a:endParaRPr lang="en-US" dirty="0"/>
           </a:p>
@@ -4374,7 +4374,7 @@
           <a:p>
             <a:fld id="{507EFB6C-7E96-8F41-8872-189CA1C59F84}" type="datetimeFigureOut">
               <a:rPr lang="en-US" dirty="0"/>
-              <a:t>5/27/2021</a:t>
+              <a:t>6/2/2021</a:t>
             </a:fld>
             <a:endParaRPr lang="en-US" dirty="0"/>
           </a:p>
@@ -4831,7 +4831,7 @@
                   </a:schemeClr>
                 </a:solidFill>
               </a:rPr>
-              <a:t>1. Juni 2021</a:t>
+              <a:t>2. Juni 2021</a:t>
             </a:fld>
             <a:endParaRPr lang="de-DE" dirty="0">
               <a:solidFill>
@@ -5047,7 +5047,7 @@
           <a:p>
             <a:fld id="{B55BA285-9698-1B45-8319-D90A8C63F150}" type="datetimeFigureOut">
               <a:rPr lang="en-US" dirty="0"/>
-              <a:t>5/27/2021</a:t>
+              <a:t>6/2/2021</a:t>
             </a:fld>
             <a:endParaRPr lang="en-US" dirty="0"/>
           </a:p>
@@ -5332,7 +5332,7 @@
           <a:p>
             <a:fld id="{0A86CD42-43FF-B740-998F-DCC3802C4CE3}" type="datetimeFigureOut">
               <a:rPr lang="en-US" dirty="0"/>
-              <a:t>5/27/2021</a:t>
+              <a:t>6/2/2021</a:t>
             </a:fld>
             <a:endParaRPr lang="en-US" dirty="0"/>
           </a:p>
@@ -5765,7 +5765,7 @@
           <a:p>
             <a:fld id="{CEA0FFBD-2EE4-8547-BBAE-A1AC91C8D77E}" type="datetimeFigureOut">
               <a:rPr lang="en-US" dirty="0"/>
-              <a:t>5/27/2021</a:t>
+              <a:t>6/2/2021</a:t>
             </a:fld>
             <a:endParaRPr lang="en-US" dirty="0"/>
           </a:p>
@@ -5931,7 +5931,7 @@
           <a:p>
             <a:fld id="{955A2352-D7AC-F242-9256-A4477BCBF354}" type="datetimeFigureOut">
               <a:rPr lang="en-US" dirty="0"/>
-              <a:t>5/27/2021</a:t>
+              <a:t>6/2/2021</a:t>
             </a:fld>
             <a:endParaRPr lang="en-US" dirty="0"/>
           </a:p>
@@ -6074,7 +6074,7 @@
           <a:p>
             <a:fld id="{4EFCFC6A-9AE6-404D-9FDD-168B477B9C90}" type="datetimeFigureOut">
               <a:rPr lang="en-US" dirty="0"/>
-              <a:t>5/27/2021</a:t>
+              <a:t>6/2/2021</a:t>
             </a:fld>
             <a:endParaRPr lang="en-US" dirty="0"/>
           </a:p>
@@ -6336,7 +6336,7 @@
           <a:p>
             <a:fld id="{61CFCDFD-B4CF-A241-8D71-E814B10BEAF4}" type="datetimeFigureOut">
               <a:rPr lang="en-US" dirty="0"/>
-              <a:t>5/27/2021</a:t>
+              <a:t>6/2/2021</a:t>
             </a:fld>
             <a:endParaRPr lang="en-US" dirty="0"/>
           </a:p>
@@ -6797,7 +6797,7 @@
           <a:p>
             <a:fld id="{26A7B589-FD4B-7E46-869A-CBADC5FC564E}" type="datetimeFigureOut">
               <a:rPr lang="en-US" dirty="0"/>
-              <a:t>5/27/2021</a:t>
+              <a:t>6/2/2021</a:t>
             </a:fld>
             <a:endParaRPr lang="en-US" dirty="0"/>
           </a:p>
@@ -7897,7 +7897,7 @@
             <a:pPr algn="r"/>
             <a:fld id="{F072743E-0297-4AC3-80E5-4C9F5D2C8935}" type="datetime4">
               <a:rPr lang="de-DE"/>
-              <a:t>1. Juni 2021</a:t>
+              <a:t>2. Juni 2021</a:t>
             </a:fld>
             <a:endParaRPr lang="de-DE" dirty="0"/>
           </a:p>
@@ -8015,15 +8015,6 @@
                 <a:latin typeface="Arial" panose="020B0604020202020204" pitchFamily="34" charset="0"/>
               </a:rPr>
               <a:t>Welche inhaltlichen Meilensteine sollen erreicht werden? D.h. welche Fragen sollen zu welchem Zeitpunkt beantwortet sein?</a:t>
-            </a:r>
-          </a:p>
-          <a:p>
-            <a:pPr algn="l"/>
-            <a:r>
-              <a:rPr lang="de-DE" sz="1800" b="0" i="0" u="none" strike="noStrike" baseline="0" dirty="0">
-                <a:latin typeface="Arial" panose="020B0604020202020204" pitchFamily="34" charset="0"/>
-              </a:rPr>
-              <a:t>Welche Tagungs- oder Journalbeiträge sind geplant?</a:t>
             </a:r>
           </a:p>
           <a:p>
@@ -8735,6 +8726,15 @@
               <a:t>Wie sind diese Fragen zu verstehen?</a:t>
             </a:r>
           </a:p>
+          <a:p>
+            <a:pPr marL="457200" lvl="1" indent="0">
+              <a:buNone/>
+            </a:pPr>
+            <a:r>
+              <a:rPr lang="de-DE" i="1" dirty="0"/>
+              <a:t>Viele Schritte bei der Erstellung einer Software können bereits automatisiert werden; z.B. neben dem automatischen Testen kann die automatische Erzeugung des User Manuels mit integriert werden.</a:t>
+            </a:r>
+          </a:p>
         </p:txBody>
       </p:sp>
     </p:spTree>
@@ -9125,15 +9125,6 @@
               <a:rPr lang="de-DE" sz="1800" b="0" i="0" u="none" strike="noStrike" baseline="0" dirty="0">
                 <a:latin typeface="Arial" panose="020B0604020202020204" pitchFamily="34" charset="0"/>
               </a:rPr>
-              <a:t>Was wird durch die Dissertation ermöglicht?</a:t>
-            </a:r>
-          </a:p>
-          <a:p>
-            <a:pPr algn="l"/>
-            <a:r>
-              <a:rPr lang="de-DE" sz="1800" b="0" i="0" u="none" strike="noStrike" baseline="0" dirty="0">
-                <a:latin typeface="Arial" panose="020B0604020202020204" pitchFamily="34" charset="0"/>
-              </a:rPr>
               <a:t>Was wird dadurch z.B. schneller, effizienter, zuverlässiger ...?</a:t>
             </a:r>
           </a:p>
@@ -9251,7 +9242,7 @@
         <p:spPr/>
         <p:txBody>
           <a:bodyPr>
-            <a:normAutofit lnSpcReduction="10000"/>
+            <a:normAutofit/>
           </a:bodyPr>
           <a:lstStyle/>
           <a:p>
@@ -9269,15 +9260,6 @@
               <a:rPr lang="de-DE" sz="1800" b="0" i="0" u="none" strike="noStrike" baseline="0" dirty="0">
                 <a:latin typeface="Arial" panose="020B0604020202020204" pitchFamily="34" charset="0"/>
               </a:rPr>
-              <a:t>Welche Recherchen sind erforderlich?</a:t>
-            </a:r>
-          </a:p>
-          <a:p>
-            <a:pPr algn="l"/>
-            <a:r>
-              <a:rPr lang="de-DE" sz="1800" b="0" i="0" u="none" strike="noStrike" baseline="0" dirty="0">
-                <a:latin typeface="Arial" panose="020B0604020202020204" pitchFamily="34" charset="0"/>
-              </a:rPr>
               <a:t>Welche Experimente sind erforderlich?</a:t>
             </a:r>
           </a:p>
@@ -9305,27 +9287,8 @@
               <a:rPr lang="de-DE" sz="1800" b="0" i="0" u="none" strike="noStrike" baseline="0" dirty="0">
                 <a:latin typeface="Arial" panose="020B0604020202020204" pitchFamily="34" charset="0"/>
               </a:rPr>
-              <a:t>Sind Probanden für die Umsetzung erforderlich?</a:t>
-            </a:r>
-          </a:p>
-          <a:p>
-            <a:pPr algn="l"/>
-            <a:r>
-              <a:rPr lang="de-DE" sz="1800" b="0" i="0" u="none" strike="noStrike" baseline="0" dirty="0">
-                <a:latin typeface="Arial" panose="020B0604020202020204" pitchFamily="34" charset="0"/>
-              </a:rPr>
               <a:t>Sind Kooperationspartner für die Umsetzung erforderlich?</a:t>
             </a:r>
-          </a:p>
-          <a:p>
-            <a:pPr algn="l"/>
-            <a:r>
-              <a:rPr lang="de-DE" sz="1800" b="0" i="0" u="none" strike="noStrike" baseline="0" dirty="0">
-                <a:latin typeface="Arial" panose="020B0604020202020204" pitchFamily="34" charset="0"/>
-              </a:rPr>
-              <a:t>Müssen neue Definitionen oder Theorien geschaffen werden?</a:t>
-            </a:r>
-            <a:endParaRPr lang="de-DE" dirty="0"/>
           </a:p>
         </p:txBody>
       </p:sp>

</xml_diff>

<commit_message>
adds references to the presentation
</commit_message>
<xml_diff>
--- a/Proposalvortrag.pptx
+++ b/Proposalvortrag.pptx
@@ -19,7 +19,8 @@
     <p:sldId id="264" r:id="rId13"/>
     <p:sldId id="272" r:id="rId14"/>
     <p:sldId id="271" r:id="rId15"/>
-    <p:sldId id="266" r:id="rId16"/>
+    <p:sldId id="273" r:id="rId16"/>
+    <p:sldId id="266" r:id="rId17"/>
   </p:sldIdLst>
   <p:sldSz cx="12192000" cy="6858000"/>
   <p:notesSz cx="6858000" cy="9144000"/>
@@ -2611,10 +2612,10 @@
         <a:lstStyle/>
         <a:p>
           <a:r>
-            <a:rPr lang="de-DE"/>
+            <a:rPr lang="de-DE" dirty="0"/>
             <a:t>Projektplanung</a:t>
           </a:r>
-          <a:endParaRPr lang="en-US"/>
+          <a:endParaRPr lang="en-US" dirty="0"/>
         </a:p>
       </dgm:t>
     </dgm:pt>
@@ -2637,6 +2638,42 @@
         <a:lstStyle/>
         <a:p>
           <a:endParaRPr lang="en-US"/>
+        </a:p>
+      </dgm:t>
+    </dgm:pt>
+    <dgm:pt modelId="{28CAAACB-5B9F-4A96-9778-8A2604806DDC}">
+      <dgm:prSet/>
+      <dgm:spPr/>
+      <dgm:t>
+        <a:bodyPr/>
+        <a:lstStyle/>
+        <a:p>
+          <a:r>
+            <a:rPr lang="en-US" dirty="0"/>
+            <a:t>Referenzen</a:t>
+          </a:r>
+        </a:p>
+      </dgm:t>
+    </dgm:pt>
+    <dgm:pt modelId="{89128E57-E849-4CA1-9EC9-8D17B57705EE}" type="parTrans" cxnId="{A972ABA9-175E-4C9E-A144-B8254B3D9823}">
+      <dgm:prSet/>
+      <dgm:spPr/>
+      <dgm:t>
+        <a:bodyPr/>
+        <a:lstStyle/>
+        <a:p>
+          <a:endParaRPr lang="de-DE"/>
+        </a:p>
+      </dgm:t>
+    </dgm:pt>
+    <dgm:pt modelId="{3E3F2256-5FE0-4443-98FA-4918739612C8}" type="sibTrans" cxnId="{A972ABA9-175E-4C9E-A144-B8254B3D9823}">
+      <dgm:prSet/>
+      <dgm:spPr/>
+      <dgm:t>
+        <a:bodyPr/>
+        <a:lstStyle/>
+        <a:p>
+          <a:endParaRPr lang="de-DE"/>
         </a:p>
       </dgm:t>
     </dgm:pt>
@@ -2651,7 +2688,7 @@
       <dgm:spPr/>
     </dgm:pt>
     <dgm:pt modelId="{8A30CA04-BACF-4E9C-9305-6CCCF7C7B31E}" type="pres">
-      <dgm:prSet presAssocID="{A98161B1-9630-4C99-84F9-9C54C371C66B}" presName="thickLine" presStyleLbl="alignNode1" presStyleIdx="0" presStyleCnt="7"/>
+      <dgm:prSet presAssocID="{A98161B1-9630-4C99-84F9-9C54C371C66B}" presName="thickLine" presStyleLbl="alignNode1" presStyleIdx="0" presStyleCnt="8"/>
       <dgm:spPr/>
     </dgm:pt>
     <dgm:pt modelId="{A8513ABB-3510-4BF5-8BAC-00AE7A0A0B4B}" type="pres">
@@ -2659,7 +2696,7 @@
       <dgm:spPr/>
     </dgm:pt>
     <dgm:pt modelId="{99ADFBB5-3E5A-4804-A925-8603C4068DA7}" type="pres">
-      <dgm:prSet presAssocID="{A98161B1-9630-4C99-84F9-9C54C371C66B}" presName="tx1" presStyleLbl="revTx" presStyleIdx="0" presStyleCnt="7"/>
+      <dgm:prSet presAssocID="{A98161B1-9630-4C99-84F9-9C54C371C66B}" presName="tx1" presStyleLbl="revTx" presStyleIdx="0" presStyleCnt="8"/>
       <dgm:spPr/>
     </dgm:pt>
     <dgm:pt modelId="{14869A64-50FB-4D06-8C97-4F048E6F6FBC}" type="pres">
@@ -2667,7 +2704,7 @@
       <dgm:spPr/>
     </dgm:pt>
     <dgm:pt modelId="{47E0C241-9725-460A-8742-AD30E1FF63D2}" type="pres">
-      <dgm:prSet presAssocID="{D5F95CE9-462C-4C80-8E98-33D0A66C870A}" presName="thickLine" presStyleLbl="alignNode1" presStyleIdx="1" presStyleCnt="7"/>
+      <dgm:prSet presAssocID="{D5F95CE9-462C-4C80-8E98-33D0A66C870A}" presName="thickLine" presStyleLbl="alignNode1" presStyleIdx="1" presStyleCnt="8"/>
       <dgm:spPr/>
     </dgm:pt>
     <dgm:pt modelId="{039386F5-6FEE-4DCF-8935-6A105F9E10AE}" type="pres">
@@ -2675,7 +2712,7 @@
       <dgm:spPr/>
     </dgm:pt>
     <dgm:pt modelId="{C571BA1B-C46F-4E73-885E-8651FC60C99E}" type="pres">
-      <dgm:prSet presAssocID="{D5F95CE9-462C-4C80-8E98-33D0A66C870A}" presName="tx1" presStyleLbl="revTx" presStyleIdx="1" presStyleCnt="7"/>
+      <dgm:prSet presAssocID="{D5F95CE9-462C-4C80-8E98-33D0A66C870A}" presName="tx1" presStyleLbl="revTx" presStyleIdx="1" presStyleCnt="8"/>
       <dgm:spPr/>
     </dgm:pt>
     <dgm:pt modelId="{AEE5F68F-FE0C-42AC-A55F-445F56FCDD0F}" type="pres">
@@ -2683,7 +2720,7 @@
       <dgm:spPr/>
     </dgm:pt>
     <dgm:pt modelId="{3513FFC8-ED32-4CCC-92F3-F13408B5C6C7}" type="pres">
-      <dgm:prSet presAssocID="{DA7E2126-AD21-4539-8E10-9989540BADC5}" presName="thickLine" presStyleLbl="alignNode1" presStyleIdx="2" presStyleCnt="7"/>
+      <dgm:prSet presAssocID="{DA7E2126-AD21-4539-8E10-9989540BADC5}" presName="thickLine" presStyleLbl="alignNode1" presStyleIdx="2" presStyleCnt="8"/>
       <dgm:spPr/>
     </dgm:pt>
     <dgm:pt modelId="{E56CEBF7-7881-4585-87FC-74A60FD2F3C7}" type="pres">
@@ -2691,7 +2728,7 @@
       <dgm:spPr/>
     </dgm:pt>
     <dgm:pt modelId="{9124DE49-0248-41E7-9074-BBCABD457B72}" type="pres">
-      <dgm:prSet presAssocID="{DA7E2126-AD21-4539-8E10-9989540BADC5}" presName="tx1" presStyleLbl="revTx" presStyleIdx="2" presStyleCnt="7"/>
+      <dgm:prSet presAssocID="{DA7E2126-AD21-4539-8E10-9989540BADC5}" presName="tx1" presStyleLbl="revTx" presStyleIdx="2" presStyleCnt="8"/>
       <dgm:spPr/>
     </dgm:pt>
     <dgm:pt modelId="{B326057B-5656-42AB-864B-B15D39E07BD8}" type="pres">
@@ -2699,7 +2736,7 @@
       <dgm:spPr/>
     </dgm:pt>
     <dgm:pt modelId="{F4DE1473-BC72-4A2E-A0C8-AAA01A2839EE}" type="pres">
-      <dgm:prSet presAssocID="{6E212DC7-47C5-45C7-8B01-3FA0D3C1F781}" presName="thickLine" presStyleLbl="alignNode1" presStyleIdx="3" presStyleCnt="7"/>
+      <dgm:prSet presAssocID="{6E212DC7-47C5-45C7-8B01-3FA0D3C1F781}" presName="thickLine" presStyleLbl="alignNode1" presStyleIdx="3" presStyleCnt="8"/>
       <dgm:spPr/>
     </dgm:pt>
     <dgm:pt modelId="{3FEAE196-D39E-4CDE-9D4D-9B0E46BE6666}" type="pres">
@@ -2707,7 +2744,7 @@
       <dgm:spPr/>
     </dgm:pt>
     <dgm:pt modelId="{CC882846-961F-462D-A9CB-C269CD7B0557}" type="pres">
-      <dgm:prSet presAssocID="{6E212DC7-47C5-45C7-8B01-3FA0D3C1F781}" presName="tx1" presStyleLbl="revTx" presStyleIdx="3" presStyleCnt="7"/>
+      <dgm:prSet presAssocID="{6E212DC7-47C5-45C7-8B01-3FA0D3C1F781}" presName="tx1" presStyleLbl="revTx" presStyleIdx="3" presStyleCnt="8"/>
       <dgm:spPr/>
     </dgm:pt>
     <dgm:pt modelId="{83C678BD-AFE9-4AB5-8254-294E9A62958D}" type="pres">
@@ -2715,7 +2752,7 @@
       <dgm:spPr/>
     </dgm:pt>
     <dgm:pt modelId="{413D9DC5-D779-42EE-8566-C8AD2AB9EDA5}" type="pres">
-      <dgm:prSet presAssocID="{34D69D1D-9F6F-4DD3-8F1C-2952F430FE2C}" presName="thickLine" presStyleLbl="alignNode1" presStyleIdx="4" presStyleCnt="7"/>
+      <dgm:prSet presAssocID="{34D69D1D-9F6F-4DD3-8F1C-2952F430FE2C}" presName="thickLine" presStyleLbl="alignNode1" presStyleIdx="4" presStyleCnt="8"/>
       <dgm:spPr/>
     </dgm:pt>
     <dgm:pt modelId="{F1B00691-EFC4-42E9-AB00-6634B66A4CEB}" type="pres">
@@ -2723,7 +2760,7 @@
       <dgm:spPr/>
     </dgm:pt>
     <dgm:pt modelId="{8A468B29-C4C9-4E43-BC3A-401559D2BB40}" type="pres">
-      <dgm:prSet presAssocID="{34D69D1D-9F6F-4DD3-8F1C-2952F430FE2C}" presName="tx1" presStyleLbl="revTx" presStyleIdx="4" presStyleCnt="7"/>
+      <dgm:prSet presAssocID="{34D69D1D-9F6F-4DD3-8F1C-2952F430FE2C}" presName="tx1" presStyleLbl="revTx" presStyleIdx="4" presStyleCnt="8"/>
       <dgm:spPr/>
     </dgm:pt>
     <dgm:pt modelId="{0C06628A-9ACD-4D2F-B726-D3408389AE59}" type="pres">
@@ -2731,7 +2768,7 @@
       <dgm:spPr/>
     </dgm:pt>
     <dgm:pt modelId="{95345A3B-37E0-45EA-B6F1-F58C60BB9D02}" type="pres">
-      <dgm:prSet presAssocID="{EB7632C3-2D07-4532-A06E-CC7393BB3BAC}" presName="thickLine" presStyleLbl="alignNode1" presStyleIdx="5" presStyleCnt="7"/>
+      <dgm:prSet presAssocID="{EB7632C3-2D07-4532-A06E-CC7393BB3BAC}" presName="thickLine" presStyleLbl="alignNode1" presStyleIdx="5" presStyleCnt="8"/>
       <dgm:spPr/>
     </dgm:pt>
     <dgm:pt modelId="{CE4EC7D0-4BBB-41A6-959A-8A7305DA5660}" type="pres">
@@ -2739,7 +2776,7 @@
       <dgm:spPr/>
     </dgm:pt>
     <dgm:pt modelId="{50495E5A-1D93-4C88-8A96-4A0BE5D067E4}" type="pres">
-      <dgm:prSet presAssocID="{EB7632C3-2D07-4532-A06E-CC7393BB3BAC}" presName="tx1" presStyleLbl="revTx" presStyleIdx="5" presStyleCnt="7"/>
+      <dgm:prSet presAssocID="{EB7632C3-2D07-4532-A06E-CC7393BB3BAC}" presName="tx1" presStyleLbl="revTx" presStyleIdx="5" presStyleCnt="8"/>
       <dgm:spPr/>
     </dgm:pt>
     <dgm:pt modelId="{B3ED04D1-2CEB-418F-A17D-205FA3FE2ABD}" type="pres">
@@ -2747,7 +2784,7 @@
       <dgm:spPr/>
     </dgm:pt>
     <dgm:pt modelId="{3A65568C-91B8-43CB-9529-E6895013D4AB}" type="pres">
-      <dgm:prSet presAssocID="{7863D36C-59DD-4C79-AF06-4134FE15173F}" presName="thickLine" presStyleLbl="alignNode1" presStyleIdx="6" presStyleCnt="7"/>
+      <dgm:prSet presAssocID="{7863D36C-59DD-4C79-AF06-4134FE15173F}" presName="thickLine" presStyleLbl="alignNode1" presStyleIdx="6" presStyleCnt="8"/>
       <dgm:spPr/>
     </dgm:pt>
     <dgm:pt modelId="{D11C3241-229D-4AF9-914A-72BA1EF9E29F}" type="pres">
@@ -2755,11 +2792,27 @@
       <dgm:spPr/>
     </dgm:pt>
     <dgm:pt modelId="{4A30226A-2AC9-47C8-BB55-25B90F65BAC6}" type="pres">
-      <dgm:prSet presAssocID="{7863D36C-59DD-4C79-AF06-4134FE15173F}" presName="tx1" presStyleLbl="revTx" presStyleIdx="6" presStyleCnt="7"/>
+      <dgm:prSet presAssocID="{7863D36C-59DD-4C79-AF06-4134FE15173F}" presName="tx1" presStyleLbl="revTx" presStyleIdx="6" presStyleCnt="8"/>
       <dgm:spPr/>
     </dgm:pt>
     <dgm:pt modelId="{3F5DD7F2-2493-404E-AE15-61172EB46F60}" type="pres">
       <dgm:prSet presAssocID="{7863D36C-59DD-4C79-AF06-4134FE15173F}" presName="vert1" presStyleCnt="0"/>
+      <dgm:spPr/>
+    </dgm:pt>
+    <dgm:pt modelId="{D0805EFD-3778-4FFF-B3F7-FC822BB3B520}" type="pres">
+      <dgm:prSet presAssocID="{28CAAACB-5B9F-4A96-9778-8A2604806DDC}" presName="thickLine" presStyleLbl="alignNode1" presStyleIdx="7" presStyleCnt="8"/>
+      <dgm:spPr/>
+    </dgm:pt>
+    <dgm:pt modelId="{E72A84A8-CB01-4137-B968-F5A5ECF6BAF2}" type="pres">
+      <dgm:prSet presAssocID="{28CAAACB-5B9F-4A96-9778-8A2604806DDC}" presName="horz1" presStyleCnt="0"/>
+      <dgm:spPr/>
+    </dgm:pt>
+    <dgm:pt modelId="{B57AA6AB-7322-4012-96C9-67982E818388}" type="pres">
+      <dgm:prSet presAssocID="{28CAAACB-5B9F-4A96-9778-8A2604806DDC}" presName="tx1" presStyleLbl="revTx" presStyleIdx="7" presStyleCnt="8"/>
+      <dgm:spPr/>
+    </dgm:pt>
+    <dgm:pt modelId="{5B881DD8-FC1D-4C02-B2F1-19C102CC0909}" type="pres">
+      <dgm:prSet presAssocID="{28CAAACB-5B9F-4A96-9778-8A2604806DDC}" presName="vert1" presStyleCnt="0"/>
       <dgm:spPr/>
     </dgm:pt>
   </dgm:ptLst>
@@ -2772,6 +2825,8 @@
     <dgm:cxn modelId="{9FB33A67-6F78-462E-A7C0-54F2C359A02D}" srcId="{191B188D-5BC7-4C9D-8768-C1898E9EBEC1}" destId="{7863D36C-59DD-4C79-AF06-4134FE15173F}" srcOrd="6" destOrd="0" parTransId="{E6EA2BA9-620B-49FB-A4D5-D9DB263E7524}" sibTransId="{950D28BD-8C0F-4C38-A9DF-9733B9EA0E78}"/>
     <dgm:cxn modelId="{DF6A297F-95AE-4F96-A736-3BEF3B3B2826}" type="presOf" srcId="{34D69D1D-9F6F-4DD3-8F1C-2952F430FE2C}" destId="{8A468B29-C4C9-4E43-BC3A-401559D2BB40}" srcOrd="0" destOrd="0" presId="urn:microsoft.com/office/officeart/2008/layout/LinedList"/>
     <dgm:cxn modelId="{168B1986-070E-4B3A-9D6C-6EADF3F8B58D}" srcId="{191B188D-5BC7-4C9D-8768-C1898E9EBEC1}" destId="{EB7632C3-2D07-4532-A06E-CC7393BB3BAC}" srcOrd="5" destOrd="0" parTransId="{431B61B2-85F6-4C96-8902-FA95D6A344D3}" sibTransId="{30A0EC4F-237B-44E9-8401-4A9A8F543DED}"/>
+    <dgm:cxn modelId="{CD1E139B-3A03-48A4-8F9F-F82599A6BEAE}" type="presOf" srcId="{28CAAACB-5B9F-4A96-9778-8A2604806DDC}" destId="{B57AA6AB-7322-4012-96C9-67982E818388}" srcOrd="0" destOrd="0" presId="urn:microsoft.com/office/officeart/2008/layout/LinedList"/>
+    <dgm:cxn modelId="{A972ABA9-175E-4C9E-A144-B8254B3D9823}" srcId="{191B188D-5BC7-4C9D-8768-C1898E9EBEC1}" destId="{28CAAACB-5B9F-4A96-9778-8A2604806DDC}" srcOrd="7" destOrd="0" parTransId="{89128E57-E849-4CA1-9EC9-8D17B57705EE}" sibTransId="{3E3F2256-5FE0-4443-98FA-4918739612C8}"/>
     <dgm:cxn modelId="{3B655CAA-51E4-4A7C-858F-DF2321B0BDC8}" srcId="{191B188D-5BC7-4C9D-8768-C1898E9EBEC1}" destId="{A98161B1-9630-4C99-84F9-9C54C371C66B}" srcOrd="0" destOrd="0" parTransId="{5E5B74E1-C200-4B15-84A9-8A93B2078C42}" sibTransId="{DCA5A2B8-8FD3-4CA6-9394-C6668F1C0780}"/>
     <dgm:cxn modelId="{6F1CE6B1-59B9-4D56-A79D-79B663E685DA}" type="presOf" srcId="{D5F95CE9-462C-4C80-8E98-33D0A66C870A}" destId="{C571BA1B-C46F-4E73-885E-8651FC60C99E}" srcOrd="0" destOrd="0" presId="urn:microsoft.com/office/officeart/2008/layout/LinedList"/>
     <dgm:cxn modelId="{6DC380D7-7867-458F-AA28-2843293BC178}" type="presOf" srcId="{DA7E2126-AD21-4539-8E10-9989540BADC5}" destId="{9124DE49-0248-41E7-9074-BBCABD457B72}" srcOrd="0" destOrd="0" presId="urn:microsoft.com/office/officeart/2008/layout/LinedList"/>
@@ -2807,6 +2862,10 @@
     <dgm:cxn modelId="{431CEFD7-C049-4BD1-9131-1B2F326DCC64}" type="presParOf" srcId="{7DC35CDE-5DD4-4E5E-96E6-AC0E013978BB}" destId="{D11C3241-229D-4AF9-914A-72BA1EF9E29F}" srcOrd="13" destOrd="0" presId="urn:microsoft.com/office/officeart/2008/layout/LinedList"/>
     <dgm:cxn modelId="{2697399C-90BE-4858-B609-DA6B12B24240}" type="presParOf" srcId="{D11C3241-229D-4AF9-914A-72BA1EF9E29F}" destId="{4A30226A-2AC9-47C8-BB55-25B90F65BAC6}" srcOrd="0" destOrd="0" presId="urn:microsoft.com/office/officeart/2008/layout/LinedList"/>
     <dgm:cxn modelId="{7AC71E62-93E5-4D4B-84E3-FB4F51F1B78C}" type="presParOf" srcId="{D11C3241-229D-4AF9-914A-72BA1EF9E29F}" destId="{3F5DD7F2-2493-404E-AE15-61172EB46F60}" srcOrd="1" destOrd="0" presId="urn:microsoft.com/office/officeart/2008/layout/LinedList"/>
+    <dgm:cxn modelId="{51A7EAFD-CC45-4166-9DDE-E0E29D5428B1}" type="presParOf" srcId="{7DC35CDE-5DD4-4E5E-96E6-AC0E013978BB}" destId="{D0805EFD-3778-4FFF-B3F7-FC822BB3B520}" srcOrd="14" destOrd="0" presId="urn:microsoft.com/office/officeart/2008/layout/LinedList"/>
+    <dgm:cxn modelId="{A09AB639-089C-4B8C-918B-12133E94FDE1}" type="presParOf" srcId="{7DC35CDE-5DD4-4E5E-96E6-AC0E013978BB}" destId="{E72A84A8-CB01-4137-B968-F5A5ECF6BAF2}" srcOrd="15" destOrd="0" presId="urn:microsoft.com/office/officeart/2008/layout/LinedList"/>
+    <dgm:cxn modelId="{A09E2518-7DBA-483E-9911-51AB8692DD31}" type="presParOf" srcId="{E72A84A8-CB01-4137-B968-F5A5ECF6BAF2}" destId="{B57AA6AB-7322-4012-96C9-67982E818388}" srcOrd="0" destOrd="0" presId="urn:microsoft.com/office/officeart/2008/layout/LinedList"/>
+    <dgm:cxn modelId="{016F106E-6312-4FB7-A7FD-C0F23AA8B4AC}" type="presParOf" srcId="{E72A84A8-CB01-4137-B968-F5A5ECF6BAF2}" destId="{5B881DD8-FC1D-4C02-B2F1-19C102CC0909}" srcOrd="1" destOrd="0" presId="urn:microsoft.com/office/officeart/2008/layout/LinedList"/>
   </dgm:cxnLst>
   <dgm:bg/>
   <dgm:whole/>
@@ -4366,7 +4425,7 @@
       </dsp:nvSpPr>
       <dsp:spPr>
         <a:xfrm>
-          <a:off x="0" y="421"/>
+          <a:off x="0" y="0"/>
           <a:ext cx="9520157" cy="0"/>
         </a:xfrm>
         <a:prstGeom prst="line">
@@ -4415,8 +4474,8 @@
       </dsp:nvSpPr>
       <dsp:spPr>
         <a:xfrm>
-          <a:off x="0" y="421"/>
-          <a:ext cx="9520157" cy="492824"/>
+          <a:off x="0" y="0"/>
+          <a:ext cx="9520157" cy="431326"/>
         </a:xfrm>
         <a:prstGeom prst="rect">
           <a:avLst/>
@@ -4440,12 +4499,12 @@
         <a:fontRef idx="minor"/>
       </dsp:style>
       <dsp:txBody>
-        <a:bodyPr spcFirstLastPara="0" vert="horz" wrap="square" lIns="80010" tIns="80010" rIns="80010" bIns="80010" numCol="1" spcCol="1270" anchor="t" anchorCtr="0">
+        <a:bodyPr spcFirstLastPara="0" vert="horz" wrap="square" lIns="68580" tIns="68580" rIns="68580" bIns="68580" numCol="1" spcCol="1270" anchor="t" anchorCtr="0">
           <a:noAutofit/>
         </a:bodyPr>
         <a:lstStyle/>
         <a:p>
-          <a:pPr marL="0" lvl="0" indent="0" algn="l" defTabSz="933450">
+          <a:pPr marL="0" lvl="0" indent="0" algn="l" defTabSz="800100">
             <a:lnSpc>
               <a:spcPct val="90000"/>
             </a:lnSpc>
@@ -4458,15 +4517,15 @@
             <a:buNone/>
           </a:pPr>
           <a:r>
-            <a:rPr lang="de-DE" sz="2100" kern="1200" dirty="0"/>
+            <a:rPr lang="de-DE" sz="1800" kern="1200" dirty="0"/>
             <a:t>Hintergrund und Kontext</a:t>
           </a:r>
-          <a:endParaRPr lang="en-US" sz="2100" kern="1200" dirty="0"/>
+          <a:endParaRPr lang="en-US" sz="1800" kern="1200" dirty="0"/>
         </a:p>
       </dsp:txBody>
       <dsp:txXfrm>
-        <a:off x="0" y="421"/>
-        <a:ext cx="9520157" cy="492824"/>
+        <a:off x="0" y="0"/>
+        <a:ext cx="9520157" cy="431326"/>
       </dsp:txXfrm>
     </dsp:sp>
     <dsp:sp modelId="{47E0C241-9725-460A-8742-AD30E1FF63D2}">
@@ -4476,7 +4535,7 @@
       </dsp:nvSpPr>
       <dsp:spPr>
         <a:xfrm>
-          <a:off x="0" y="493245"/>
+          <a:off x="0" y="431326"/>
           <a:ext cx="9520157" cy="0"/>
         </a:xfrm>
         <a:prstGeom prst="line">
@@ -4525,8 +4584,8 @@
       </dsp:nvSpPr>
       <dsp:spPr>
         <a:xfrm>
-          <a:off x="0" y="493245"/>
-          <a:ext cx="9520157" cy="492824"/>
+          <a:off x="0" y="431326"/>
+          <a:ext cx="9520157" cy="431326"/>
         </a:xfrm>
         <a:prstGeom prst="rect">
           <a:avLst/>
@@ -4550,12 +4609,12 @@
         <a:fontRef idx="minor"/>
       </dsp:style>
       <dsp:txBody>
-        <a:bodyPr spcFirstLastPara="0" vert="horz" wrap="square" lIns="80010" tIns="80010" rIns="80010" bIns="80010" numCol="1" spcCol="1270" anchor="t" anchorCtr="0">
+        <a:bodyPr spcFirstLastPara="0" vert="horz" wrap="square" lIns="68580" tIns="68580" rIns="68580" bIns="68580" numCol="1" spcCol="1270" anchor="t" anchorCtr="0">
           <a:noAutofit/>
         </a:bodyPr>
         <a:lstStyle/>
         <a:p>
-          <a:pPr marL="0" lvl="0" indent="0" algn="l" defTabSz="933450">
+          <a:pPr marL="0" lvl="0" indent="0" algn="l" defTabSz="800100">
             <a:lnSpc>
               <a:spcPct val="90000"/>
             </a:lnSpc>
@@ -4568,15 +4627,15 @@
             <a:buNone/>
           </a:pPr>
           <a:r>
-            <a:rPr lang="de-DE" sz="2100" kern="1200" dirty="0"/>
+            <a:rPr lang="de-DE" sz="1800" kern="1200" dirty="0"/>
             <a:t>Problematik</a:t>
           </a:r>
-          <a:endParaRPr lang="en-US" sz="2100" kern="1200" dirty="0"/>
+          <a:endParaRPr lang="en-US" sz="1800" kern="1200" dirty="0"/>
         </a:p>
       </dsp:txBody>
       <dsp:txXfrm>
-        <a:off x="0" y="493245"/>
-        <a:ext cx="9520157" cy="492824"/>
+        <a:off x="0" y="431326"/>
+        <a:ext cx="9520157" cy="431326"/>
       </dsp:txXfrm>
     </dsp:sp>
     <dsp:sp modelId="{3513FFC8-ED32-4CCC-92F3-F13408B5C6C7}">
@@ -4586,7 +4645,7 @@
       </dsp:nvSpPr>
       <dsp:spPr>
         <a:xfrm>
-          <a:off x="0" y="986069"/>
+          <a:off x="0" y="862653"/>
           <a:ext cx="9520157" cy="0"/>
         </a:xfrm>
         <a:prstGeom prst="line">
@@ -4635,8 +4694,8 @@
       </dsp:nvSpPr>
       <dsp:spPr>
         <a:xfrm>
-          <a:off x="0" y="986069"/>
-          <a:ext cx="9520157" cy="492824"/>
+          <a:off x="0" y="862653"/>
+          <a:ext cx="9520157" cy="431326"/>
         </a:xfrm>
         <a:prstGeom prst="rect">
           <a:avLst/>
@@ -4660,12 +4719,12 @@
         <a:fontRef idx="minor"/>
       </dsp:style>
       <dsp:txBody>
-        <a:bodyPr spcFirstLastPara="0" vert="horz" wrap="square" lIns="80010" tIns="80010" rIns="80010" bIns="80010" numCol="1" spcCol="1270" anchor="t" anchorCtr="0">
+        <a:bodyPr spcFirstLastPara="0" vert="horz" wrap="square" lIns="68580" tIns="68580" rIns="68580" bIns="68580" numCol="1" spcCol="1270" anchor="t" anchorCtr="0">
           <a:noAutofit/>
         </a:bodyPr>
         <a:lstStyle/>
         <a:p>
-          <a:pPr marL="0" lvl="0" indent="0" algn="l" defTabSz="933450">
+          <a:pPr marL="0" lvl="0" indent="0" algn="l" defTabSz="800100">
             <a:lnSpc>
               <a:spcPct val="90000"/>
             </a:lnSpc>
@@ -4678,15 +4737,15 @@
             <a:buNone/>
           </a:pPr>
           <a:r>
-            <a:rPr lang="de-DE" sz="2100" kern="1200" dirty="0"/>
+            <a:rPr lang="de-DE" sz="1800" kern="1200" dirty="0"/>
             <a:t>Stand der Forschung</a:t>
           </a:r>
-          <a:endParaRPr lang="en-US" sz="2100" kern="1200" dirty="0"/>
+          <a:endParaRPr lang="en-US" sz="1800" kern="1200" dirty="0"/>
         </a:p>
       </dsp:txBody>
       <dsp:txXfrm>
-        <a:off x="0" y="986069"/>
-        <a:ext cx="9520157" cy="492824"/>
+        <a:off x="0" y="862653"/>
+        <a:ext cx="9520157" cy="431326"/>
       </dsp:txXfrm>
     </dsp:sp>
     <dsp:sp modelId="{F4DE1473-BC72-4A2E-A0C8-AAA01A2839EE}">
@@ -4696,7 +4755,7 @@
       </dsp:nvSpPr>
       <dsp:spPr>
         <a:xfrm>
-          <a:off x="0" y="1478894"/>
+          <a:off x="0" y="1293979"/>
           <a:ext cx="9520157" cy="0"/>
         </a:xfrm>
         <a:prstGeom prst="line">
@@ -4745,8 +4804,8 @@
       </dsp:nvSpPr>
       <dsp:spPr>
         <a:xfrm>
-          <a:off x="0" y="1478894"/>
-          <a:ext cx="9520157" cy="492824"/>
+          <a:off x="0" y="1293979"/>
+          <a:ext cx="9520157" cy="431326"/>
         </a:xfrm>
         <a:prstGeom prst="rect">
           <a:avLst/>
@@ -4770,12 +4829,12 @@
         <a:fontRef idx="minor"/>
       </dsp:style>
       <dsp:txBody>
-        <a:bodyPr spcFirstLastPara="0" vert="horz" wrap="square" lIns="80010" tIns="80010" rIns="80010" bIns="80010" numCol="1" spcCol="1270" anchor="t" anchorCtr="0">
+        <a:bodyPr spcFirstLastPara="0" vert="horz" wrap="square" lIns="68580" tIns="68580" rIns="68580" bIns="68580" numCol="1" spcCol="1270" anchor="t" anchorCtr="0">
           <a:noAutofit/>
         </a:bodyPr>
         <a:lstStyle/>
         <a:p>
-          <a:pPr marL="0" lvl="0" indent="0" algn="l" defTabSz="933450">
+          <a:pPr marL="0" lvl="0" indent="0" algn="l" defTabSz="800100">
             <a:lnSpc>
               <a:spcPct val="90000"/>
             </a:lnSpc>
@@ -4788,15 +4847,15 @@
             <a:buNone/>
           </a:pPr>
           <a:r>
-            <a:rPr lang="de-DE" sz="2100" kern="1200" dirty="0"/>
+            <a:rPr lang="de-DE" sz="1800" kern="1200" dirty="0"/>
             <a:t>Ziele</a:t>
           </a:r>
-          <a:endParaRPr lang="en-US" sz="2100" kern="1200" dirty="0"/>
+          <a:endParaRPr lang="en-US" sz="1800" kern="1200" dirty="0"/>
         </a:p>
       </dsp:txBody>
       <dsp:txXfrm>
-        <a:off x="0" y="1478894"/>
-        <a:ext cx="9520157" cy="492824"/>
+        <a:off x="0" y="1293979"/>
+        <a:ext cx="9520157" cy="431326"/>
       </dsp:txXfrm>
     </dsp:sp>
     <dsp:sp modelId="{413D9DC5-D779-42EE-8566-C8AD2AB9EDA5}">
@@ -4806,7 +4865,7 @@
       </dsp:nvSpPr>
       <dsp:spPr>
         <a:xfrm>
-          <a:off x="0" y="1971718"/>
+          <a:off x="0" y="1725306"/>
           <a:ext cx="9520157" cy="0"/>
         </a:xfrm>
         <a:prstGeom prst="line">
@@ -4855,8 +4914,8 @@
       </dsp:nvSpPr>
       <dsp:spPr>
         <a:xfrm>
-          <a:off x="0" y="1971718"/>
-          <a:ext cx="9520157" cy="492824"/>
+          <a:off x="0" y="1725306"/>
+          <a:ext cx="9520157" cy="431326"/>
         </a:xfrm>
         <a:prstGeom prst="rect">
           <a:avLst/>
@@ -4880,12 +4939,12 @@
         <a:fontRef idx="minor"/>
       </dsp:style>
       <dsp:txBody>
-        <a:bodyPr spcFirstLastPara="0" vert="horz" wrap="square" lIns="80010" tIns="80010" rIns="80010" bIns="80010" numCol="1" spcCol="1270" anchor="t" anchorCtr="0">
+        <a:bodyPr spcFirstLastPara="0" vert="horz" wrap="square" lIns="68580" tIns="68580" rIns="68580" bIns="68580" numCol="1" spcCol="1270" anchor="t" anchorCtr="0">
           <a:noAutofit/>
         </a:bodyPr>
         <a:lstStyle/>
         <a:p>
-          <a:pPr marL="0" lvl="0" indent="0" algn="l" defTabSz="933450">
+          <a:pPr marL="0" lvl="0" indent="0" algn="l" defTabSz="800100">
             <a:lnSpc>
               <a:spcPct val="90000"/>
             </a:lnSpc>
@@ -4898,15 +4957,15 @@
             <a:buNone/>
           </a:pPr>
           <a:r>
-            <a:rPr lang="de-DE" sz="2100" kern="1200" dirty="0"/>
+            <a:rPr lang="de-DE" sz="1800" kern="1200" dirty="0"/>
             <a:t>Relevanz und Nutzen</a:t>
           </a:r>
-          <a:endParaRPr lang="en-US" sz="2100" kern="1200" dirty="0"/>
+          <a:endParaRPr lang="en-US" sz="1800" kern="1200" dirty="0"/>
         </a:p>
       </dsp:txBody>
       <dsp:txXfrm>
-        <a:off x="0" y="1971718"/>
-        <a:ext cx="9520157" cy="492824"/>
+        <a:off x="0" y="1725306"/>
+        <a:ext cx="9520157" cy="431326"/>
       </dsp:txXfrm>
     </dsp:sp>
     <dsp:sp modelId="{95345A3B-37E0-45EA-B6F1-F58C60BB9D02}">
@@ -4916,7 +4975,7 @@
       </dsp:nvSpPr>
       <dsp:spPr>
         <a:xfrm>
-          <a:off x="0" y="2464543"/>
+          <a:off x="0" y="2156633"/>
           <a:ext cx="9520157" cy="0"/>
         </a:xfrm>
         <a:prstGeom prst="line">
@@ -4965,8 +5024,8 @@
       </dsp:nvSpPr>
       <dsp:spPr>
         <a:xfrm>
-          <a:off x="0" y="2464543"/>
-          <a:ext cx="9520157" cy="492824"/>
+          <a:off x="0" y="2156633"/>
+          <a:ext cx="9520157" cy="431326"/>
         </a:xfrm>
         <a:prstGeom prst="rect">
           <a:avLst/>
@@ -4990,12 +5049,12 @@
         <a:fontRef idx="minor"/>
       </dsp:style>
       <dsp:txBody>
-        <a:bodyPr spcFirstLastPara="0" vert="horz" wrap="square" lIns="80010" tIns="80010" rIns="80010" bIns="80010" numCol="1" spcCol="1270" anchor="t" anchorCtr="0">
+        <a:bodyPr spcFirstLastPara="0" vert="horz" wrap="square" lIns="68580" tIns="68580" rIns="68580" bIns="68580" numCol="1" spcCol="1270" anchor="t" anchorCtr="0">
           <a:noAutofit/>
         </a:bodyPr>
         <a:lstStyle/>
         <a:p>
-          <a:pPr marL="0" lvl="0" indent="0" algn="l" defTabSz="933450">
+          <a:pPr marL="0" lvl="0" indent="0" algn="l" defTabSz="800100">
             <a:lnSpc>
               <a:spcPct val="90000"/>
             </a:lnSpc>
@@ -5008,15 +5067,15 @@
             <a:buNone/>
           </a:pPr>
           <a:r>
-            <a:rPr lang="de-DE" sz="2100" kern="1200"/>
+            <a:rPr lang="de-DE" sz="1800" kern="1200"/>
             <a:t>Methodologie</a:t>
           </a:r>
-          <a:endParaRPr lang="en-US" sz="2100" kern="1200"/>
+          <a:endParaRPr lang="en-US" sz="1800" kern="1200"/>
         </a:p>
       </dsp:txBody>
       <dsp:txXfrm>
-        <a:off x="0" y="2464543"/>
-        <a:ext cx="9520157" cy="492824"/>
+        <a:off x="0" y="2156633"/>
+        <a:ext cx="9520157" cy="431326"/>
       </dsp:txXfrm>
     </dsp:sp>
     <dsp:sp modelId="{3A65568C-91B8-43CB-9529-E6895013D4AB}">
@@ -5026,7 +5085,7 @@
       </dsp:nvSpPr>
       <dsp:spPr>
         <a:xfrm>
-          <a:off x="0" y="2957367"/>
+          <a:off x="0" y="2587959"/>
           <a:ext cx="9520157" cy="0"/>
         </a:xfrm>
         <a:prstGeom prst="line">
@@ -5075,8 +5134,8 @@
       </dsp:nvSpPr>
       <dsp:spPr>
         <a:xfrm>
-          <a:off x="0" y="2957367"/>
-          <a:ext cx="9520157" cy="492824"/>
+          <a:off x="0" y="2587959"/>
+          <a:ext cx="9520157" cy="431326"/>
         </a:xfrm>
         <a:prstGeom prst="rect">
           <a:avLst/>
@@ -5100,12 +5159,12 @@
         <a:fontRef idx="minor"/>
       </dsp:style>
       <dsp:txBody>
-        <a:bodyPr spcFirstLastPara="0" vert="horz" wrap="square" lIns="80010" tIns="80010" rIns="80010" bIns="80010" numCol="1" spcCol="1270" anchor="t" anchorCtr="0">
+        <a:bodyPr spcFirstLastPara="0" vert="horz" wrap="square" lIns="68580" tIns="68580" rIns="68580" bIns="68580" numCol="1" spcCol="1270" anchor="t" anchorCtr="0">
           <a:noAutofit/>
         </a:bodyPr>
         <a:lstStyle/>
         <a:p>
-          <a:pPr marL="0" lvl="0" indent="0" algn="l" defTabSz="933450">
+          <a:pPr marL="0" lvl="0" indent="0" algn="l" defTabSz="800100">
             <a:lnSpc>
               <a:spcPct val="90000"/>
             </a:lnSpc>
@@ -5118,15 +5177,124 @@
             <a:buNone/>
           </a:pPr>
           <a:r>
-            <a:rPr lang="de-DE" sz="2100" kern="1200"/>
+            <a:rPr lang="de-DE" sz="1800" kern="1200" dirty="0"/>
             <a:t>Projektplanung</a:t>
           </a:r>
-          <a:endParaRPr lang="en-US" sz="2100" kern="1200"/>
+          <a:endParaRPr lang="en-US" sz="1800" kern="1200" dirty="0"/>
         </a:p>
       </dsp:txBody>
       <dsp:txXfrm>
-        <a:off x="0" y="2957367"/>
-        <a:ext cx="9520157" cy="492824"/>
+        <a:off x="0" y="2587959"/>
+        <a:ext cx="9520157" cy="431326"/>
+      </dsp:txXfrm>
+    </dsp:sp>
+    <dsp:sp modelId="{D0805EFD-3778-4FFF-B3F7-FC822BB3B520}">
+      <dsp:nvSpPr>
+        <dsp:cNvPr id="0" name=""/>
+        <dsp:cNvSpPr/>
+      </dsp:nvSpPr>
+      <dsp:spPr>
+        <a:xfrm>
+          <a:off x="0" y="3019286"/>
+          <a:ext cx="9520157" cy="0"/>
+        </a:xfrm>
+        <a:prstGeom prst="line">
+          <a:avLst/>
+        </a:prstGeom>
+        <a:solidFill>
+          <a:schemeClr val="accent1">
+            <a:hueOff val="0"/>
+            <a:satOff val="0"/>
+            <a:lumOff val="0"/>
+            <a:alphaOff val="0"/>
+          </a:schemeClr>
+        </a:solidFill>
+        <a:ln w="15875" cap="flat" cmpd="sng" algn="ctr">
+          <a:solidFill>
+            <a:schemeClr val="accent1">
+              <a:hueOff val="0"/>
+              <a:satOff val="0"/>
+              <a:lumOff val="0"/>
+              <a:alphaOff val="0"/>
+            </a:schemeClr>
+          </a:solidFill>
+          <a:prstDash val="solid"/>
+        </a:ln>
+        <a:effectLst/>
+      </dsp:spPr>
+      <dsp:style>
+        <a:lnRef idx="2">
+          <a:scrgbClr r="0" g="0" b="0"/>
+        </a:lnRef>
+        <a:fillRef idx="1">
+          <a:scrgbClr r="0" g="0" b="0"/>
+        </a:fillRef>
+        <a:effectRef idx="0">
+          <a:scrgbClr r="0" g="0" b="0"/>
+        </a:effectRef>
+        <a:fontRef idx="minor">
+          <a:schemeClr val="lt1"/>
+        </a:fontRef>
+      </dsp:style>
+    </dsp:sp>
+    <dsp:sp modelId="{B57AA6AB-7322-4012-96C9-67982E818388}">
+      <dsp:nvSpPr>
+        <dsp:cNvPr id="0" name=""/>
+        <dsp:cNvSpPr/>
+      </dsp:nvSpPr>
+      <dsp:spPr>
+        <a:xfrm>
+          <a:off x="0" y="3019286"/>
+          <a:ext cx="9520157" cy="431326"/>
+        </a:xfrm>
+        <a:prstGeom prst="rect">
+          <a:avLst/>
+        </a:prstGeom>
+        <a:noFill/>
+        <a:ln>
+          <a:noFill/>
+        </a:ln>
+        <a:effectLst/>
+      </dsp:spPr>
+      <dsp:style>
+        <a:lnRef idx="0">
+          <a:scrgbClr r="0" g="0" b="0"/>
+        </a:lnRef>
+        <a:fillRef idx="0">
+          <a:scrgbClr r="0" g="0" b="0"/>
+        </a:fillRef>
+        <a:effectRef idx="0">
+          <a:scrgbClr r="0" g="0" b="0"/>
+        </a:effectRef>
+        <a:fontRef idx="minor"/>
+      </dsp:style>
+      <dsp:txBody>
+        <a:bodyPr spcFirstLastPara="0" vert="horz" wrap="square" lIns="68580" tIns="68580" rIns="68580" bIns="68580" numCol="1" spcCol="1270" anchor="t" anchorCtr="0">
+          <a:noAutofit/>
+        </a:bodyPr>
+        <a:lstStyle/>
+        <a:p>
+          <a:pPr marL="0" lvl="0" indent="0" algn="l" defTabSz="800100">
+            <a:lnSpc>
+              <a:spcPct val="90000"/>
+            </a:lnSpc>
+            <a:spcBef>
+              <a:spcPct val="0"/>
+            </a:spcBef>
+            <a:spcAft>
+              <a:spcPct val="35000"/>
+            </a:spcAft>
+            <a:buNone/>
+          </a:pPr>
+          <a:r>
+            <a:rPr lang="en-US" sz="1800" kern="1200" dirty="0"/>
+            <a:t>Referenzen</a:t>
+          </a:r>
+        </a:p>
+      </dsp:txBody>
+      <dsp:txXfrm>
+        <a:off x="0" y="3019286"/>
+        <a:ext cx="9520157" cy="431326"/>
       </dsp:txXfrm>
     </dsp:sp>
   </dsp:spTree>
@@ -11732,7 +11900,7 @@
           <a:p>
             <a:fld id="{A423BF71-38B7-8642-BFCE-EDAE9BD0CBAF}" type="datetimeFigureOut">
               <a:rPr lang="en-US" dirty="0"/>
-              <a:t>6/2/2021</a:t>
+              <a:t>6/3/2021</a:t>
             </a:fld>
             <a:endParaRPr lang="en-US" dirty="0"/>
           </a:p>
@@ -11955,7 +12123,7 @@
           <a:p>
             <a:fld id="{73B025CB-9D18-264E-A945-2D020344C9DA}" type="datetimeFigureOut">
               <a:rPr lang="en-US" dirty="0"/>
-              <a:t>6/2/2021</a:t>
+              <a:t>6/3/2021</a:t>
             </a:fld>
             <a:endParaRPr lang="en-US" dirty="0"/>
           </a:p>
@@ -12187,7 +12355,7 @@
           <a:p>
             <a:fld id="{507EFB6C-7E96-8F41-8872-189CA1C59F84}" type="datetimeFigureOut">
               <a:rPr lang="en-US" dirty="0"/>
-              <a:t>6/2/2021</a:t>
+              <a:t>6/3/2021</a:t>
             </a:fld>
             <a:endParaRPr lang="en-US" dirty="0"/>
           </a:p>
@@ -12601,7 +12769,7 @@
                   </a:schemeClr>
                 </a:solidFill>
               </a:rPr>
-              <a:t>/13</a:t>
+              <a:t>/16</a:t>
             </a:r>
           </a:p>
         </p:txBody>
@@ -12644,7 +12812,7 @@
                   </a:schemeClr>
                 </a:solidFill>
               </a:rPr>
-              <a:t>2. Juni 2021</a:t>
+              <a:t>3. Juni 2021</a:t>
             </a:fld>
             <a:endParaRPr lang="de-DE" dirty="0">
               <a:solidFill>
@@ -12860,7 +13028,7 @@
           <a:p>
             <a:fld id="{B55BA285-9698-1B45-8319-D90A8C63F150}" type="datetimeFigureOut">
               <a:rPr lang="en-US" dirty="0"/>
-              <a:t>6/2/2021</a:t>
+              <a:t>6/3/2021</a:t>
             </a:fld>
             <a:endParaRPr lang="en-US" dirty="0"/>
           </a:p>
@@ -13145,7 +13313,7 @@
           <a:p>
             <a:fld id="{0A86CD42-43FF-B740-998F-DCC3802C4CE3}" type="datetimeFigureOut">
               <a:rPr lang="en-US" dirty="0"/>
-              <a:t>6/2/2021</a:t>
+              <a:t>6/3/2021</a:t>
             </a:fld>
             <a:endParaRPr lang="en-US" dirty="0"/>
           </a:p>
@@ -13578,7 +13746,7 @@
           <a:p>
             <a:fld id="{CEA0FFBD-2EE4-8547-BBAE-A1AC91C8D77E}" type="datetimeFigureOut">
               <a:rPr lang="en-US" dirty="0"/>
-              <a:t>6/2/2021</a:t>
+              <a:t>6/3/2021</a:t>
             </a:fld>
             <a:endParaRPr lang="en-US" dirty="0"/>
           </a:p>
@@ -13744,7 +13912,7 @@
           <a:p>
             <a:fld id="{955A2352-D7AC-F242-9256-A4477BCBF354}" type="datetimeFigureOut">
               <a:rPr lang="en-US" dirty="0"/>
-              <a:t>6/2/2021</a:t>
+              <a:t>6/3/2021</a:t>
             </a:fld>
             <a:endParaRPr lang="en-US" dirty="0"/>
           </a:p>
@@ -13887,7 +14055,7 @@
           <a:p>
             <a:fld id="{4EFCFC6A-9AE6-404D-9FDD-168B477B9C90}" type="datetimeFigureOut">
               <a:rPr lang="en-US" dirty="0"/>
-              <a:t>6/2/2021</a:t>
+              <a:t>6/3/2021</a:t>
             </a:fld>
             <a:endParaRPr lang="en-US" dirty="0"/>
           </a:p>
@@ -14149,7 +14317,7 @@
           <a:p>
             <a:fld id="{61CFCDFD-B4CF-A241-8D71-E814B10BEAF4}" type="datetimeFigureOut">
               <a:rPr lang="en-US" dirty="0"/>
-              <a:t>6/2/2021</a:t>
+              <a:t>6/3/2021</a:t>
             </a:fld>
             <a:endParaRPr lang="en-US" dirty="0"/>
           </a:p>
@@ -14610,7 +14778,7 @@
           <a:p>
             <a:fld id="{26A7B589-FD4B-7E46-869A-CBADC5FC564E}" type="datetimeFigureOut">
               <a:rPr lang="en-US" dirty="0"/>
-              <a:t>6/2/2021</a:t>
+              <a:t>6/3/2021</a:t>
             </a:fld>
             <a:endParaRPr lang="en-US" dirty="0"/>
           </a:p>
@@ -15710,7 +15878,7 @@
             <a:pPr algn="r"/>
             <a:fld id="{F072743E-0297-4AC3-80E5-4C9F5D2C8935}" type="datetime4">
               <a:rPr lang="de-DE"/>
-              <a:t>2. Juni 2021</a:t>
+              <a:t>3. Juni 2021</a:t>
             </a:fld>
             <a:endParaRPr lang="de-DE" dirty="0"/>
           </a:p>
@@ -16447,6 +16615,118 @@
       </p:grpSpPr>
       <p:sp>
         <p:nvSpPr>
+          <p:cNvPr id="2" name="Título 1">
+            <a:extLst>
+              <a:ext uri="{FF2B5EF4-FFF2-40B4-BE49-F238E27FC236}">
+                <a16:creationId xmlns:a16="http://schemas.microsoft.com/office/drawing/2014/main" id="{FF281848-865B-40FB-8353-EE3CC897CDB1}"/>
+              </a:ext>
+            </a:extLst>
+          </p:cNvPr>
+          <p:cNvSpPr>
+            <a:spLocks noGrp="1"/>
+          </p:cNvSpPr>
+          <p:nvPr>
+            <p:ph type="title"/>
+          </p:nvPr>
+        </p:nvSpPr>
+        <p:spPr/>
+        <p:txBody>
+          <a:bodyPr/>
+          <a:lstStyle/>
+          <a:p>
+            <a:r>
+              <a:rPr lang="de-DE" dirty="0"/>
+              <a:t>Referenzen</a:t>
+            </a:r>
+          </a:p>
+        </p:txBody>
+      </p:sp>
+      <p:sp>
+        <p:nvSpPr>
+          <p:cNvPr id="3" name="Marcador de contenido 2">
+            <a:extLst>
+              <a:ext uri="{FF2B5EF4-FFF2-40B4-BE49-F238E27FC236}">
+                <a16:creationId xmlns:a16="http://schemas.microsoft.com/office/drawing/2014/main" id="{81ACE999-0CB5-4B90-B5D2-37A799BB91FC}"/>
+              </a:ext>
+            </a:extLst>
+          </p:cNvPr>
+          <p:cNvSpPr>
+            <a:spLocks noGrp="1"/>
+          </p:cNvSpPr>
+          <p:nvPr>
+            <p:ph idx="1"/>
+          </p:nvPr>
+        </p:nvSpPr>
+        <p:spPr/>
+        <p:txBody>
+          <a:bodyPr/>
+          <a:lstStyle/>
+          <a:p>
+            <a:r>
+              <a:rPr lang="de-DE" sz="1800" dirty="0"/>
+              <a:t>Amalfitano, D., Fasolino, A. R.  and Tramontana, P. (2011) „Using Dynamic Analysis for Generating End User Documentation for Web 2.0“</a:t>
+            </a:r>
+          </a:p>
+          <a:p>
+            <a:r>
+              <a:rPr lang="de-DE" sz="1800" dirty="0"/>
+              <a:t>M. Descher, T. Feilhauer, L. Amann (2014) „Automated user documentation generation based on the Eclipse application model“</a:t>
+            </a:r>
+          </a:p>
+          <a:p>
+            <a:r>
+              <a:rPr lang="de-DE" sz="1800" dirty="0"/>
+              <a:t>Oliveira, A. d. S. (2017) „GuideAutomator: Automated User Manual Generation with Markdown“</a:t>
+            </a:r>
+          </a:p>
+          <a:p>
+            <a:r>
+              <a:rPr lang="de-DE" sz="1800" dirty="0"/>
+              <a:t>Gök, O., Ersoy, P., Börühan, G. (2019) „</a:t>
+            </a:r>
+            <a:r>
+              <a:rPr lang="en-US" sz="1800" dirty="0"/>
+              <a:t>The effect of user manual quality on customer satisfaction: the mediating effect of perceived product quality”</a:t>
+            </a:r>
+            <a:endParaRPr lang="de-DE" sz="1800" dirty="0"/>
+          </a:p>
+          <a:p>
+            <a:endParaRPr lang="de-DE" dirty="0"/>
+          </a:p>
+        </p:txBody>
+      </p:sp>
+    </p:spTree>
+    <p:extLst>
+      <p:ext uri="{BB962C8B-B14F-4D97-AF65-F5344CB8AC3E}">
+        <p14:creationId xmlns:p14="http://schemas.microsoft.com/office/powerpoint/2010/main" val="3752054290"/>
+      </p:ext>
+    </p:extLst>
+  </p:cSld>
+  <p:clrMapOvr>
+    <a:masterClrMapping/>
+  </p:clrMapOvr>
+</p:sld>
+</file>
+
+<file path=ppt/slides/slide16.xml><?xml version="1.0" encoding="utf-8"?>
+<p:sld xmlns:a="http://schemas.openxmlformats.org/drawingml/2006/main" xmlns:r="http://schemas.openxmlformats.org/officeDocument/2006/relationships" xmlns:p="http://schemas.openxmlformats.org/presentationml/2006/main">
+  <p:cSld>
+    <p:spTree>
+      <p:nvGrpSpPr>
+        <p:cNvPr id="1" name=""/>
+        <p:cNvGrpSpPr/>
+        <p:nvPr/>
+      </p:nvGrpSpPr>
+      <p:grpSpPr>
+        <a:xfrm>
+          <a:off x="0" y="0"/>
+          <a:ext cx="0" cy="0"/>
+          <a:chOff x="0" y="0"/>
+          <a:chExt cx="0" cy="0"/>
+        </a:xfrm>
+      </p:grpSpPr>
+      <p:sp>
+        <p:nvSpPr>
           <p:cNvPr id="4" name="CuadroTexto 3">
             <a:extLst>
               <a:ext uri="{FF2B5EF4-FFF2-40B4-BE49-F238E27FC236}">
@@ -16557,7 +16837,7 @@
             <p:ph idx="1"/>
             <p:extLst>
               <p:ext uri="{D42A27DB-BD31-4B8C-83A1-F6EECF244321}">
-                <p14:modId xmlns:p14="http://schemas.microsoft.com/office/powerpoint/2010/main" val="3957874033"/>
+                <p14:modId xmlns:p14="http://schemas.microsoft.com/office/powerpoint/2010/main" val="510024888"/>
               </p:ext>
             </p:extLst>
           </p:nvPr>
@@ -17234,31 +17514,13 @@
               <a:rPr lang="de-DE" sz="1600" dirty="0">
                 <a:latin typeface="Arial" panose="020B0604020202020204" pitchFamily="34" charset="0"/>
               </a:rPr>
-              <a:t> (</a:t>
-            </a:r>
-            <a:r>
-              <a:rPr lang="de-DE" sz="1600" dirty="0" err="1">
-                <a:latin typeface="Arial" panose="020B0604020202020204" pitchFamily="34" charset="0"/>
-              </a:rPr>
-              <a:t>Descher</a:t>
-            </a:r>
-            <a:r>
-              <a:rPr lang="de-DE" sz="1600" dirty="0">
-                <a:latin typeface="Arial" panose="020B0604020202020204" pitchFamily="34" charset="0"/>
-              </a:rPr>
-              <a:t> et al., 2014) , </a:t>
-            </a:r>
-            <a:r>
-              <a:rPr lang="de-DE" sz="1600" b="0" i="0" u="none" strike="noStrike" baseline="0" dirty="0" err="1">
-                <a:latin typeface="Arial" panose="020B0604020202020204" pitchFamily="34" charset="0"/>
-              </a:rPr>
-              <a:t>GuideAutomator</a:t>
+              <a:t> (Descher et al., 2014) , </a:t>
             </a:r>
             <a:r>
               <a:rPr lang="de-DE" sz="1600" b="0" i="0" u="none" strike="noStrike" baseline="0" dirty="0">
                 <a:latin typeface="Arial" panose="020B0604020202020204" pitchFamily="34" charset="0"/>
               </a:rPr>
-              <a:t> (Souza, Oliveira, 2017)</a:t>
+              <a:t>GuideAutomator (Souza, Oliveira, 2017)</a:t>
             </a:r>
           </a:p>
         </p:txBody>

</xml_diff>